<commit_message>
Created main script, started on manual signing and checking for MVP
</commit_message>
<xml_diff>
--- a/Documents/Final Presentation.pptx
+++ b/Documents/Final Presentation.pptx
@@ -6,12 +6,13 @@
   </p:sldMasterIdLst>
   <p:sldIdLst>
     <p:sldId id="256" r:id="rId2"/>
-    <p:sldId id="257" r:id="rId3"/>
-    <p:sldId id="258" r:id="rId4"/>
-    <p:sldId id="259" r:id="rId5"/>
+    <p:sldId id="258" r:id="rId3"/>
+    <p:sldId id="259" r:id="rId4"/>
+    <p:sldId id="261" r:id="rId5"/>
     <p:sldId id="260" r:id="rId6"/>
-    <p:sldId id="261" r:id="rId7"/>
-    <p:sldId id="262" r:id="rId8"/>
+    <p:sldId id="263" r:id="rId7"/>
+    <p:sldId id="264" r:id="rId8"/>
+    <p:sldId id="262" r:id="rId9"/>
   </p:sldIdLst>
   <p:sldSz cx="12192000" cy="6858000"/>
   <p:notesSz cx="6858000" cy="9144000"/>
@@ -3885,11 +3886,7 @@
           <a:p>
             <a:r>
               <a:rPr lang="en-US" dirty="0" smtClean="0"/>
-              <a:t>John </a:t>
-            </a:r>
-            <a:r>
-              <a:rPr lang="en-US" dirty="0" smtClean="0"/>
-              <a:t>Hardy</a:t>
+              <a:t>John Hardy</a:t>
             </a:r>
           </a:p>
           <a:p>
@@ -3897,7 +3894,6 @@
               <a:rPr lang="en-US" dirty="0" smtClean="0"/>
               <a:t>4/8/2019</a:t>
             </a:r>
-            <a:endParaRPr lang="en-US" dirty="0" smtClean="0"/>
           </a:p>
         </p:txBody>
       </p:sp>
@@ -3948,7 +3944,7 @@
           <a:p>
             <a:r>
               <a:rPr lang="en-US" dirty="0" smtClean="0"/>
-              <a:t>What is code signing?</a:t>
+              <a:t>How Safexec Works</a:t>
             </a:r>
             <a:endParaRPr lang="en-US" dirty="0"/>
           </a:p>
@@ -3964,7 +3960,12 @@
             <p:ph idx="1"/>
           </p:nvPr>
         </p:nvSpPr>
-        <p:spPr/>
+        <p:spPr>
+          <a:xfrm>
+            <a:off x="1097280" y="1845734"/>
+            <a:ext cx="10058400" cy="4023360"/>
+          </a:xfrm>
+        </p:spPr>
         <p:txBody>
           <a:bodyPr/>
           <a:lstStyle/>
@@ -3974,12 +3975,43 @@
               <a:buChar char="•"/>
             </a:pPr>
             <a:r>
-              <a:rPr lang="en-US" dirty="0"/>
-              <a:t>Code signing is the process of digitally signing executables and scripts to confirm the software author and guarantee that the code has not been altered or corrupted since it was signed</a:t>
-            </a:r>
-            <a:r>
-              <a:rPr lang="en-US" dirty="0" smtClean="0"/>
-              <a:t>.</a:t>
+              <a:rPr lang="en-US" dirty="0" smtClean="0"/>
+              <a:t>My project has two parts:</a:t>
+            </a:r>
+          </a:p>
+          <a:p>
+            <a:pPr marL="544068" lvl="1" indent="-342900">
+              <a:buFont typeface="+mj-lt"/>
+              <a:buAutoNum type="arabicPeriod"/>
+            </a:pPr>
+            <a:r>
+              <a:rPr lang="en-US" dirty="0" smtClean="0"/>
+              <a:t>Create an application that will sign an ELF (Executable and Linkable Format) file.</a:t>
+            </a:r>
+          </a:p>
+          <a:p>
+            <a:pPr lvl="2">
+              <a:buFont typeface="Arial" panose="020B0604020202020204" pitchFamily="34" charset="0"/>
+              <a:buChar char="•"/>
+            </a:pPr>
+            <a:r>
+              <a:rPr lang="en-US" dirty="0" smtClean="0"/>
+              <a:t>Result is a new safe-to-execute file format called “ELFS” (Executable and Linkable Format Secure</a:t>
+            </a:r>
+            <a:r>
+              <a:rPr lang="en-US" dirty="0" smtClean="0"/>
+              <a:t>) which is sent to the end user.</a:t>
+            </a:r>
+            <a:endParaRPr lang="en-US" dirty="0" smtClean="0"/>
+          </a:p>
+          <a:p>
+            <a:pPr marL="544068" lvl="1" indent="-342900">
+              <a:buFont typeface="+mj-lt"/>
+              <a:buAutoNum type="arabicPeriod"/>
+            </a:pPr>
+            <a:r>
+              <a:rPr lang="en-US" dirty="0" smtClean="0"/>
+              <a:t>At runtime, the ELFS file is checked to ensure that it has not been modified. The file is then turned back into an ELF file.</a:t>
             </a:r>
           </a:p>
           <a:p>
@@ -3989,7 +4021,27 @@
             </a:pPr>
             <a:r>
               <a:rPr lang="en-US" dirty="0" smtClean="0"/>
-              <a:t>In other words, it is used to verify that the code has not been tampered with.</a:t>
+              <a:t>Target audience:</a:t>
+            </a:r>
+          </a:p>
+          <a:p>
+            <a:pPr lvl="1">
+              <a:buFont typeface="Arial" panose="020B0604020202020204" pitchFamily="34" charset="0"/>
+              <a:buChar char="•"/>
+            </a:pPr>
+            <a:r>
+              <a:rPr lang="en-US" dirty="0" smtClean="0"/>
+              <a:t>Anyone who downloads or uses code from a questionable source</a:t>
+            </a:r>
+          </a:p>
+          <a:p>
+            <a:pPr lvl="1">
+              <a:buFont typeface="Arial" panose="020B0604020202020204" pitchFamily="34" charset="0"/>
+              <a:buChar char="•"/>
+            </a:pPr>
+            <a:r>
+              <a:rPr lang="en-US" dirty="0" smtClean="0"/>
+              <a:t>i.e. Digital Forensics Investigators, White Hat Hackers, Casual Deep-web Users</a:t>
             </a:r>
             <a:endParaRPr lang="en-US" dirty="0"/>
           </a:p>
@@ -3997,9 +4049,9 @@
       </p:sp>
       <p:pic>
         <p:nvPicPr>
-          <p:cNvPr id="2052" name="Picture 4" descr="Image result for hashing function"/>
+          <p:cNvPr id="4" name="Picture 3"/>
           <p:cNvPicPr>
-            <a:picLocks noChangeAspect="1" noChangeArrowheads="1"/>
+            <a:picLocks noChangeAspect="1"/>
           </p:cNvPicPr>
           <p:nvPr/>
         </p:nvPicPr>
@@ -4011,35 +4063,24 @@
               </a:ext>
             </a:extLst>
           </a:blip>
-          <a:srcRect/>
           <a:stretch>
             <a:fillRect/>
           </a:stretch>
         </p:blipFill>
-        <p:spPr bwMode="auto">
-          <a:xfrm>
-            <a:off x="3216592" y="3745019"/>
-            <a:ext cx="5819775" cy="2124075"/>
+        <p:spPr>
+          <a:xfrm>
+            <a:off x="4223657" y="4747983"/>
+            <a:ext cx="3805578" cy="1458425"/>
           </a:xfrm>
           <a:prstGeom prst="rect">
             <a:avLst/>
           </a:prstGeom>
-          <a:noFill/>
-          <a:extLst>
-            <a:ext uri="{909E8E84-426E-40DD-AFC4-6F175D3DCCD1}">
-              <a14:hiddenFill xmlns:a14="http://schemas.microsoft.com/office/drawing/2010/main">
-                <a:solidFill>
-                  <a:srgbClr val="FFFFFF"/>
-                </a:solidFill>
-              </a14:hiddenFill>
-            </a:ext>
-          </a:extLst>
         </p:spPr>
       </p:pic>
     </p:spTree>
     <p:extLst>
       <p:ext uri="{BB962C8B-B14F-4D97-AF65-F5344CB8AC3E}">
-        <p14:creationId xmlns:p14="http://schemas.microsoft.com/office/powerpoint/2010/main" val="4184513427"/>
+        <p14:creationId xmlns:p14="http://schemas.microsoft.com/office/powerpoint/2010/main" val="3496159867"/>
       </p:ext>
     </p:extLst>
   </p:cSld>
@@ -4083,7 +4124,7 @@
           <a:p>
             <a:r>
               <a:rPr lang="en-US" dirty="0" smtClean="0"/>
-              <a:t>Project Description</a:t>
+              <a:t>What I Have Accomplished</a:t>
             </a:r>
             <a:endParaRPr lang="en-US" dirty="0"/>
           </a:p>
@@ -4099,14 +4140,11 @@
             <p:ph idx="1"/>
           </p:nvPr>
         </p:nvSpPr>
-        <p:spPr>
-          <a:xfrm>
-            <a:off x="1097280" y="1845734"/>
-            <a:ext cx="10058400" cy="4023360"/>
-          </a:xfrm>
-        </p:spPr>
-        <p:txBody>
-          <a:bodyPr/>
+        <p:spPr/>
+        <p:txBody>
+          <a:bodyPr>
+            <a:normAutofit/>
+          </a:bodyPr>
           <a:lstStyle/>
           <a:p>
             <a:pPr>
@@ -4115,7 +4153,7 @@
             </a:pPr>
             <a:r>
               <a:rPr lang="en-US" dirty="0" smtClean="0"/>
-              <a:t>My project has two parts:</a:t>
+              <a:t>Through this project I have completed the following tasks:</a:t>
             </a:r>
           </a:p>
           <a:p>
@@ -4125,21 +4163,8 @@
             </a:pPr>
             <a:r>
               <a:rPr lang="en-US" dirty="0" smtClean="0"/>
-              <a:t>Create an application that will sign an </a:t>
-            </a:r>
-            <a:r>
-              <a:rPr lang="en-US" dirty="0" smtClean="0"/>
-              <a:t>ELF </a:t>
-            </a:r>
-            <a:r>
-              <a:rPr lang="en-US" dirty="0" smtClean="0"/>
-              <a:t>(Executable and Linkable Format) file</a:t>
-            </a:r>
-            <a:r>
-              <a:rPr lang="en-US" dirty="0" smtClean="0"/>
-              <a:t>.</a:t>
-            </a:r>
-            <a:endParaRPr lang="en-US" dirty="0" smtClean="0"/>
+              <a:t>Hashing files of any size using a hashing algorithm</a:t>
+            </a:r>
           </a:p>
           <a:p>
             <a:pPr lvl="1">
@@ -4148,7 +4173,7 @@
             </a:pPr>
             <a:r>
               <a:rPr lang="en-US" dirty="0" smtClean="0"/>
-              <a:t>Result is a new safe-to-execute file format called “ELFS” (Executable and Linkable Format Secure)</a:t>
+              <a:t>Manipulation of files and navigation of the file system in Python</a:t>
             </a:r>
           </a:p>
           <a:p>
@@ -4158,18 +4183,7 @@
             </a:pPr>
             <a:r>
               <a:rPr lang="en-US" dirty="0" smtClean="0"/>
-              <a:t>At runtime, the ELFS file is checked to ensure that it has not been modified. The file is then turned back into an ELF file.</a:t>
-            </a:r>
-            <a:endParaRPr lang="en-US" dirty="0" smtClean="0"/>
-          </a:p>
-          <a:p>
-            <a:pPr>
-              <a:buFont typeface="Arial" panose="020B0604020202020204" pitchFamily="34" charset="0"/>
-              <a:buChar char="•"/>
-            </a:pPr>
-            <a:r>
-              <a:rPr lang="en-US" dirty="0" smtClean="0"/>
-              <a:t>Target audience:</a:t>
+              <a:t>Implementation of a rigorous unit testing framework to patch bugs</a:t>
             </a:r>
           </a:p>
           <a:p>
@@ -4179,7 +4193,7 @@
             </a:pPr>
             <a:r>
               <a:rPr lang="en-US" dirty="0" smtClean="0"/>
-              <a:t>Anyone who downloads or uses code from a questionable source</a:t>
+              <a:t>Building a familiarity with Python and common Python libraries</a:t>
             </a:r>
           </a:p>
           <a:p>
@@ -4189,16 +4203,158 @@
             </a:pPr>
             <a:r>
               <a:rPr lang="en-US" dirty="0" smtClean="0"/>
-              <a:t>i.e. Digital Forensics Investigators, White Hat Hackers, Casual Deep-web Users</a:t>
-            </a:r>
-            <a:endParaRPr lang="en-US" dirty="0"/>
-          </a:p>
-        </p:txBody>
-      </p:sp>
+              <a:t>Learning about modern hashing algorithms</a:t>
+            </a:r>
+          </a:p>
+          <a:p>
+            <a:pPr lvl="1">
+              <a:buFont typeface="Arial" panose="020B0604020202020204" pitchFamily="34" charset="0"/>
+              <a:buChar char="•"/>
+            </a:pPr>
+            <a:r>
+              <a:rPr lang="en-US" dirty="0" smtClean="0"/>
+              <a:t>Modifying files using hexadecimal file editor software</a:t>
+            </a:r>
+          </a:p>
+          <a:p>
+            <a:pPr lvl="1">
+              <a:buFont typeface="Arial" panose="020B0604020202020204" pitchFamily="34" charset="0"/>
+              <a:buChar char="•"/>
+            </a:pPr>
+            <a:r>
+              <a:rPr lang="en-US" dirty="0" smtClean="0"/>
+              <a:t>Understanding the basics of code signing</a:t>
+            </a:r>
+          </a:p>
+        </p:txBody>
+      </p:sp>
+      <p:pic>
+        <p:nvPicPr>
+          <p:cNvPr id="3074" name="Picture 2" descr="Image result for Python"/>
+          <p:cNvPicPr>
+            <a:picLocks noChangeAspect="1" noChangeArrowheads="1"/>
+          </p:cNvPicPr>
+          <p:nvPr/>
+        </p:nvPicPr>
+        <p:blipFill>
+          <a:blip r:embed="rId2">
+            <a:extLst>
+              <a:ext uri="{28A0092B-C50C-407E-A947-70E740481C1C}">
+                <a14:useLocalDpi xmlns:a14="http://schemas.microsoft.com/office/drawing/2010/main" val="0"/>
+              </a:ext>
+            </a:extLst>
+          </a:blip>
+          <a:srcRect/>
+          <a:stretch>
+            <a:fillRect/>
+          </a:stretch>
+        </p:blipFill>
+        <p:spPr bwMode="auto">
+          <a:xfrm>
+            <a:off x="8075024" y="1896111"/>
+            <a:ext cx="1905000" cy="1905000"/>
+          </a:xfrm>
+          <a:prstGeom prst="rect">
+            <a:avLst/>
+          </a:prstGeom>
+          <a:noFill/>
+          <a:extLst>
+            <a:ext uri="{909E8E84-426E-40DD-AFC4-6F175D3DCCD1}">
+              <a14:hiddenFill xmlns:a14="http://schemas.microsoft.com/office/drawing/2010/main">
+                <a:solidFill>
+                  <a:srgbClr val="FFFFFF"/>
+                </a:solidFill>
+              </a14:hiddenFill>
+            </a:ext>
+          </a:extLst>
+        </p:spPr>
+      </p:pic>
+      <p:pic>
+        <p:nvPicPr>
+          <p:cNvPr id="3078" name="Picture 6" descr="Image result for SHA512"/>
+          <p:cNvPicPr>
+            <a:picLocks noChangeAspect="1" noChangeArrowheads="1"/>
+          </p:cNvPicPr>
+          <p:nvPr/>
+        </p:nvPicPr>
+        <p:blipFill>
+          <a:blip r:embed="rId3">
+            <a:extLst>
+              <a:ext uri="{28A0092B-C50C-407E-A947-70E740481C1C}">
+                <a14:useLocalDpi xmlns:a14="http://schemas.microsoft.com/office/drawing/2010/main" val="0"/>
+              </a:ext>
+            </a:extLst>
+          </a:blip>
+          <a:srcRect/>
+          <a:stretch>
+            <a:fillRect/>
+          </a:stretch>
+        </p:blipFill>
+        <p:spPr bwMode="auto">
+          <a:xfrm>
+            <a:off x="9446579" y="3959862"/>
+            <a:ext cx="1909232" cy="1909232"/>
+          </a:xfrm>
+          <a:prstGeom prst="rect">
+            <a:avLst/>
+          </a:prstGeom>
+          <a:noFill/>
+          <a:extLst>
+            <a:ext uri="{909E8E84-426E-40DD-AFC4-6F175D3DCCD1}">
+              <a14:hiddenFill xmlns:a14="http://schemas.microsoft.com/office/drawing/2010/main">
+                <a:solidFill>
+                  <a:srgbClr val="FFFFFF"/>
+                </a:solidFill>
+              </a14:hiddenFill>
+            </a:ext>
+          </a:extLst>
+        </p:spPr>
+      </p:pic>
+      <p:pic>
+        <p:nvPicPr>
+          <p:cNvPr id="1026" name="Picture 2" descr="Image result for hxd"/>
+          <p:cNvPicPr>
+            <a:picLocks noChangeAspect="1" noChangeArrowheads="1"/>
+          </p:cNvPicPr>
+          <p:nvPr/>
+        </p:nvPicPr>
+        <p:blipFill>
+          <a:blip r:embed="rId4">
+            <a:extLst>
+              <a:ext uri="{28A0092B-C50C-407E-A947-70E740481C1C}">
+                <a14:useLocalDpi xmlns:a14="http://schemas.microsoft.com/office/drawing/2010/main" val="0"/>
+              </a:ext>
+            </a:extLst>
+          </a:blip>
+          <a:srcRect/>
+          <a:stretch>
+            <a:fillRect/>
+          </a:stretch>
+        </p:blipFill>
+        <p:spPr bwMode="auto">
+          <a:xfrm>
+            <a:off x="6693597" y="4060011"/>
+            <a:ext cx="2170005" cy="2170006"/>
+          </a:xfrm>
+          <a:prstGeom prst="rect">
+            <a:avLst/>
+          </a:prstGeom>
+          <a:noFill/>
+          <a:extLst>
+            <a:ext uri="{909E8E84-426E-40DD-AFC4-6F175D3DCCD1}">
+              <a14:hiddenFill xmlns:a14="http://schemas.microsoft.com/office/drawing/2010/main">
+                <a:solidFill>
+                  <a:srgbClr val="FFFFFF"/>
+                </a:solidFill>
+              </a14:hiddenFill>
+            </a:ext>
+          </a:extLst>
+        </p:spPr>
+      </p:pic>
     </p:spTree>
     <p:extLst>
       <p:ext uri="{BB962C8B-B14F-4D97-AF65-F5344CB8AC3E}">
-        <p14:creationId xmlns:p14="http://schemas.microsoft.com/office/powerpoint/2010/main" val="3496159867"/>
+        <p14:creationId xmlns:p14="http://schemas.microsoft.com/office/powerpoint/2010/main" val="1042559107"/>
       </p:ext>
     </p:extLst>
   </p:cSld>
@@ -4242,7 +4398,7 @@
           <a:p>
             <a:r>
               <a:rPr lang="en-US" dirty="0" smtClean="0"/>
-              <a:t>Tools</a:t>
+              <a:t>Why I Made Safexec</a:t>
             </a:r>
             <a:endParaRPr lang="en-US" dirty="0"/>
           </a:p>
@@ -4269,7 +4425,7 @@
             </a:pPr>
             <a:r>
               <a:rPr lang="en-US" dirty="0" smtClean="0"/>
-              <a:t>For this project I will be using:</a:t>
+              <a:t>Why I am interested:</a:t>
             </a:r>
           </a:p>
           <a:p>
@@ -4279,7 +4435,11 @@
             </a:pPr>
             <a:r>
               <a:rPr lang="en-US" dirty="0" smtClean="0"/>
-              <a:t>Python</a:t>
+              <a:t>Cryptography </a:t>
+            </a:r>
+            <a:r>
+              <a:rPr lang="en-US" dirty="0" smtClean="0"/>
+              <a:t>is fun!</a:t>
             </a:r>
           </a:p>
           <a:p>
@@ -4288,16 +4448,8 @@
               <a:buChar char="•"/>
             </a:pPr>
             <a:r>
-              <a:rPr lang="en-US" dirty="0" err="1"/>
-              <a:t>h</a:t>
-            </a:r>
-            <a:r>
-              <a:rPr lang="en-US" dirty="0" err="1" smtClean="0"/>
-              <a:t>ashlib</a:t>
-            </a:r>
-            <a:r>
-              <a:rPr lang="en-US" dirty="0" smtClean="0"/>
-              <a:t> (a hashing algorithm module)</a:t>
+              <a:rPr lang="en-US" dirty="0" smtClean="0"/>
+              <a:t>I wanted to work on a project that would focus on my future career</a:t>
             </a:r>
           </a:p>
           <a:p>
@@ -4307,16 +4459,21 @@
             </a:pPr>
             <a:r>
               <a:rPr lang="en-US" dirty="0" smtClean="0"/>
-              <a:t>Secure Hash Algorithm v3 </a:t>
-            </a:r>
-          </a:p>
-          <a:p>
-            <a:pPr marL="201168" lvl="1" indent="0">
-              <a:buNone/>
+              <a:t>I want to make my own application from </a:t>
+            </a:r>
+            <a:r>
+              <a:rPr lang="en-US" dirty="0" smtClean="0"/>
+              <a:t>scratch</a:t>
+            </a:r>
+          </a:p>
+          <a:p>
+            <a:pPr>
+              <a:buFont typeface="Arial" panose="020B0604020202020204" pitchFamily="34" charset="0"/>
+              <a:buChar char="•"/>
             </a:pPr>
             <a:r>
               <a:rPr lang="en-US" dirty="0" smtClean="0"/>
-              <a:t>   (SHA-3 512 bit version)</a:t>
+              <a:t>How it has challenged me:</a:t>
             </a:r>
           </a:p>
           <a:p>
@@ -4326,7 +4483,7 @@
             </a:pPr>
             <a:r>
               <a:rPr lang="en-US" dirty="0" smtClean="0"/>
-              <a:t>Ubuntu</a:t>
+              <a:t>Uses many of my software development skills</a:t>
             </a:r>
           </a:p>
           <a:p>
@@ -4336,15 +4493,43 @@
             </a:pPr>
             <a:r>
               <a:rPr lang="en-US" dirty="0" smtClean="0"/>
-              <a:t>Hex Editor</a:t>
-            </a:r>
+              <a:t>Challenges me to work on a tight schedule</a:t>
+            </a:r>
+            <a:endParaRPr lang="en-US" dirty="0"/>
+          </a:p>
+          <a:p>
+            <a:pPr lvl="1">
+              <a:buFont typeface="Arial" panose="020B0604020202020204" pitchFamily="34" charset="0"/>
+              <a:buChar char="•"/>
+            </a:pPr>
+            <a:r>
+              <a:rPr lang="en-US" dirty="0" smtClean="0"/>
+              <a:t>Forced me to get </a:t>
+            </a:r>
+            <a:r>
+              <a:rPr lang="en-US" dirty="0"/>
+              <a:t>out of my comfort zone</a:t>
+            </a:r>
+          </a:p>
+          <a:p>
+            <a:pPr lvl="1">
+              <a:buFont typeface="Arial" panose="020B0604020202020204" pitchFamily="34" charset="0"/>
+              <a:buChar char="•"/>
+            </a:pPr>
+            <a:endParaRPr lang="en-US" dirty="0" smtClean="0"/>
+          </a:p>
+          <a:p>
+            <a:pPr lvl="1">
+              <a:buFont typeface="Arial" panose="020B0604020202020204" pitchFamily="34" charset="0"/>
+              <a:buChar char="•"/>
+            </a:pPr>
             <a:endParaRPr lang="en-US" dirty="0"/>
           </a:p>
         </p:txBody>
       </p:sp>
       <p:pic>
         <p:nvPicPr>
-          <p:cNvPr id="3074" name="Picture 2" descr="Image result for Python"/>
+          <p:cNvPr id="4098" name="Picture 2" descr="Related image"/>
           <p:cNvPicPr>
             <a:picLocks noChangeAspect="1" noChangeArrowheads="1"/>
           </p:cNvPicPr>
@@ -4365,8 +4550,8 @@
         </p:blipFill>
         <p:spPr bwMode="auto">
           <a:xfrm>
-            <a:off x="9250680" y="1845734"/>
-            <a:ext cx="1905000" cy="1905000"/>
+            <a:off x="7093527" y="2819295"/>
+            <a:ext cx="4062153" cy="3049799"/>
           </a:xfrm>
           <a:prstGeom prst="rect">
             <a:avLst/>
@@ -4383,92 +4568,10 @@
           </a:extLst>
         </p:spPr>
       </p:pic>
-      <p:pic>
-        <p:nvPicPr>
-          <p:cNvPr id="3076" name="Picture 4" descr="Image result for ubuntu logo"/>
-          <p:cNvPicPr>
-            <a:picLocks noChangeAspect="1" noChangeArrowheads="1"/>
-          </p:cNvPicPr>
-          <p:nvPr/>
-        </p:nvPicPr>
-        <p:blipFill>
-          <a:blip r:embed="rId3">
-            <a:extLst>
-              <a:ext uri="{28A0092B-C50C-407E-A947-70E740481C1C}">
-                <a14:useLocalDpi xmlns:a14="http://schemas.microsoft.com/office/drawing/2010/main" val="0"/>
-              </a:ext>
-            </a:extLst>
-          </a:blip>
-          <a:srcRect/>
-          <a:stretch>
-            <a:fillRect/>
-          </a:stretch>
-        </p:blipFill>
-        <p:spPr bwMode="auto">
-          <a:xfrm>
-            <a:off x="6279284" y="1845734"/>
-            <a:ext cx="1905000" cy="1905000"/>
-          </a:xfrm>
-          <a:prstGeom prst="rect">
-            <a:avLst/>
-          </a:prstGeom>
-          <a:noFill/>
-          <a:extLst>
-            <a:ext uri="{909E8E84-426E-40DD-AFC4-6F175D3DCCD1}">
-              <a14:hiddenFill xmlns:a14="http://schemas.microsoft.com/office/drawing/2010/main">
-                <a:solidFill>
-                  <a:srgbClr val="FFFFFF"/>
-                </a:solidFill>
-              </a14:hiddenFill>
-            </a:ext>
-          </a:extLst>
-        </p:spPr>
-      </p:pic>
-      <p:pic>
-        <p:nvPicPr>
-          <p:cNvPr id="3078" name="Picture 6" descr="Image result for SHA512"/>
-          <p:cNvPicPr>
-            <a:picLocks noChangeAspect="1" noChangeArrowheads="1"/>
-          </p:cNvPicPr>
-          <p:nvPr/>
-        </p:nvPicPr>
-        <p:blipFill>
-          <a:blip r:embed="rId4">
-            <a:extLst>
-              <a:ext uri="{28A0092B-C50C-407E-A947-70E740481C1C}">
-                <a14:useLocalDpi xmlns:a14="http://schemas.microsoft.com/office/drawing/2010/main" val="0"/>
-              </a:ext>
-            </a:extLst>
-          </a:blip>
-          <a:srcRect/>
-          <a:stretch>
-            <a:fillRect/>
-          </a:stretch>
-        </p:blipFill>
-        <p:spPr bwMode="auto">
-          <a:xfrm>
-            <a:off x="7772169" y="3590714"/>
-            <a:ext cx="2438400" cy="2438400"/>
-          </a:xfrm>
-          <a:prstGeom prst="rect">
-            <a:avLst/>
-          </a:prstGeom>
-          <a:noFill/>
-          <a:extLst>
-            <a:ext uri="{909E8E84-426E-40DD-AFC4-6F175D3DCCD1}">
-              <a14:hiddenFill xmlns:a14="http://schemas.microsoft.com/office/drawing/2010/main">
-                <a:solidFill>
-                  <a:srgbClr val="FFFFFF"/>
-                </a:solidFill>
-              </a14:hiddenFill>
-            </a:ext>
-          </a:extLst>
-        </p:spPr>
-      </p:pic>
     </p:spTree>
     <p:extLst>
       <p:ext uri="{BB962C8B-B14F-4D97-AF65-F5344CB8AC3E}">
-        <p14:creationId xmlns:p14="http://schemas.microsoft.com/office/powerpoint/2010/main" val="1042559107"/>
+        <p14:creationId xmlns:p14="http://schemas.microsoft.com/office/powerpoint/2010/main" val="2854928045"/>
       </p:ext>
     </p:extLst>
   </p:cSld>
@@ -4512,7 +4615,7 @@
           <a:p>
             <a:r>
               <a:rPr lang="en-US" dirty="0" smtClean="0"/>
-              <a:t>User’s Point of View</a:t>
+              <a:t>User Interface Examples and Demonstration</a:t>
             </a:r>
             <a:endParaRPr lang="en-US" dirty="0"/>
           </a:p>
@@ -4559,15 +4662,7 @@
             </a:pPr>
             <a:r>
               <a:rPr lang="en-US" dirty="0" smtClean="0"/>
-              <a:t>Run the </a:t>
-            </a:r>
-            <a:r>
-              <a:rPr lang="en-US" dirty="0" err="1" smtClean="0"/>
-              <a:t>Safexec</a:t>
-            </a:r>
-            <a:r>
-              <a:rPr lang="en-US" dirty="0" smtClean="0"/>
-              <a:t> application</a:t>
+              <a:t>Run the Safexec application</a:t>
             </a:r>
           </a:p>
           <a:p>
@@ -4577,7 +4672,11 @@
             </a:pPr>
             <a:r>
               <a:rPr lang="en-US" dirty="0" smtClean="0"/>
-              <a:t>Provide the file location of the binary executable file</a:t>
+              <a:t>Provide </a:t>
+            </a:r>
+            <a:r>
+              <a:rPr lang="en-US" dirty="0" smtClean="0"/>
+              <a:t>the file location of the binary executable file</a:t>
             </a:r>
           </a:p>
           <a:p>
@@ -4703,7 +4802,7 @@
           <a:p>
             <a:r>
               <a:rPr lang="en-US" dirty="0" smtClean="0"/>
-              <a:t>Why am I interested?</a:t>
+              <a:t>Challenges Encountered</a:t>
             </a:r>
             <a:endParaRPr lang="en-US" dirty="0"/>
           </a:p>
@@ -4711,7 +4810,7 @@
       </p:sp>
       <p:sp>
         <p:nvSpPr>
-          <p:cNvPr id="3" name="Content Placeholder 2"/>
+          <p:cNvPr id="4" name="Content Placeholder 2"/>
           <p:cNvSpPr>
             <a:spLocks noGrp="1"/>
           </p:cNvSpPr>
@@ -4719,7 +4818,12 @@
             <p:ph idx="1"/>
           </p:nvPr>
         </p:nvSpPr>
-        <p:spPr/>
+        <p:spPr>
+          <a:xfrm>
+            <a:off x="1097279" y="1845734"/>
+            <a:ext cx="6635931" cy="4023360"/>
+          </a:xfrm>
+        </p:spPr>
         <p:txBody>
           <a:bodyPr/>
           <a:lstStyle/>
@@ -4730,7 +4834,17 @@
             </a:pPr>
             <a:r>
               <a:rPr lang="en-US" dirty="0" smtClean="0"/>
-              <a:t>Cryptography is fun!</a:t>
+              <a:t>My greatest challenge has been staying on schedule and working continuously.</a:t>
+            </a:r>
+          </a:p>
+          <a:p>
+            <a:pPr lvl="1">
+              <a:buFont typeface="Arial" panose="020B0604020202020204" pitchFamily="34" charset="0"/>
+              <a:buChar char="•"/>
+            </a:pPr>
+            <a:r>
+              <a:rPr lang="en-US" dirty="0" smtClean="0"/>
+              <a:t>With only one set due date for my project to be turned in on, I have had difficulty not procrastinating on my work.</a:t>
             </a:r>
           </a:p>
           <a:p>
@@ -4740,7 +4854,17 @@
             </a:pPr>
             <a:r>
               <a:rPr lang="en-US" dirty="0" smtClean="0"/>
-              <a:t>I wanted to work on a project that would focus on my future career</a:t>
+              <a:t>My largest problem faced was discovering that ELF file headers where too small to fit a large 64byte hash inside of them.</a:t>
+            </a:r>
+          </a:p>
+          <a:p>
+            <a:pPr lvl="1">
+              <a:buFont typeface="Arial" panose="020B0604020202020204" pitchFamily="34" charset="0"/>
+              <a:buChar char="•"/>
+            </a:pPr>
+            <a:r>
+              <a:rPr lang="en-US" dirty="0" smtClean="0"/>
+              <a:t>My solution was to create an entirely new file type called ELFS.</a:t>
             </a:r>
           </a:p>
           <a:p>
@@ -4750,27 +4874,17 @@
             </a:pPr>
             <a:r>
               <a:rPr lang="en-US" dirty="0" smtClean="0"/>
-              <a:t>I want to make my own application from scratch</a:t>
-            </a:r>
-          </a:p>
-          <a:p>
-            <a:pPr>
+              <a:t>I have also faced challenges creating effective unit tests that cover all of the parts of my code and ensure that everything works as expected.</a:t>
+            </a:r>
+          </a:p>
+          <a:p>
+            <a:pPr lvl="1">
               <a:buFont typeface="Arial" panose="020B0604020202020204" pitchFamily="34" charset="0"/>
               <a:buChar char="•"/>
             </a:pPr>
             <a:r>
               <a:rPr lang="en-US" dirty="0" smtClean="0"/>
-              <a:t>I want to practice modifying the Linux operating system</a:t>
-            </a:r>
-          </a:p>
-          <a:p>
-            <a:pPr>
-              <a:buFont typeface="Arial" panose="020B0604020202020204" pitchFamily="34" charset="0"/>
-              <a:buChar char="•"/>
-            </a:pPr>
-            <a:r>
-              <a:rPr lang="en-US" dirty="0" smtClean="0"/>
-              <a:t>Get out of my comfort zone</a:t>
+              <a:t>I have implemented custom Python exceptions to make input testing much easier.</a:t>
             </a:r>
             <a:endParaRPr lang="en-US" dirty="0"/>
           </a:p>
@@ -4778,7 +4892,7 @@
       </p:sp>
       <p:pic>
         <p:nvPicPr>
-          <p:cNvPr id="4098" name="Picture 2" descr="Related image"/>
+          <p:cNvPr id="2052" name="Picture 4" descr="Image result for procrastination"/>
           <p:cNvPicPr>
             <a:picLocks noChangeAspect="1" noChangeArrowheads="1"/>
           </p:cNvPicPr>
@@ -4799,8 +4913,8 @@
         </p:blipFill>
         <p:spPr bwMode="auto">
           <a:xfrm>
-            <a:off x="7093527" y="2819295"/>
-            <a:ext cx="4062153" cy="3049799"/>
+            <a:off x="7942217" y="1845734"/>
+            <a:ext cx="3475718" cy="1829325"/>
           </a:xfrm>
           <a:prstGeom prst="rect">
             <a:avLst/>
@@ -4817,10 +4931,51 @@
           </a:extLst>
         </p:spPr>
       </p:pic>
+      <p:pic>
+        <p:nvPicPr>
+          <p:cNvPr id="2054" name="Picture 6" descr="Image result for xkcd software testing"/>
+          <p:cNvPicPr>
+            <a:picLocks noChangeAspect="1" noChangeArrowheads="1"/>
+          </p:cNvPicPr>
+          <p:nvPr/>
+        </p:nvPicPr>
+        <p:blipFill>
+          <a:blip r:embed="rId3" cstate="print">
+            <a:extLst>
+              <a:ext uri="{28A0092B-C50C-407E-A947-70E740481C1C}">
+                <a14:useLocalDpi xmlns:a14="http://schemas.microsoft.com/office/drawing/2010/main" val="0"/>
+              </a:ext>
+            </a:extLst>
+          </a:blip>
+          <a:srcRect/>
+          <a:stretch>
+            <a:fillRect/>
+          </a:stretch>
+        </p:blipFill>
+        <p:spPr bwMode="auto">
+          <a:xfrm>
+            <a:off x="8864198" y="3783433"/>
+            <a:ext cx="1631755" cy="2492603"/>
+          </a:xfrm>
+          <a:prstGeom prst="rect">
+            <a:avLst/>
+          </a:prstGeom>
+          <a:noFill/>
+          <a:extLst>
+            <a:ext uri="{909E8E84-426E-40DD-AFC4-6F175D3DCCD1}">
+              <a14:hiddenFill xmlns:a14="http://schemas.microsoft.com/office/drawing/2010/main">
+                <a:solidFill>
+                  <a:srgbClr val="FFFFFF"/>
+                </a:solidFill>
+              </a14:hiddenFill>
+            </a:ext>
+          </a:extLst>
+        </p:spPr>
+      </p:pic>
     </p:spTree>
     <p:extLst>
       <p:ext uri="{BB962C8B-B14F-4D97-AF65-F5344CB8AC3E}">
-        <p14:creationId xmlns:p14="http://schemas.microsoft.com/office/powerpoint/2010/main" val="2854928045"/>
+        <p14:creationId xmlns:p14="http://schemas.microsoft.com/office/powerpoint/2010/main" val="599965026"/>
       </p:ext>
     </p:extLst>
   </p:cSld>
@@ -4854,6 +5009,259 @@
             <a:spLocks noGrp="1"/>
           </p:cNvSpPr>
           <p:nvPr>
+            <p:ph type="title"/>
+          </p:nvPr>
+        </p:nvSpPr>
+        <p:spPr/>
+        <p:txBody>
+          <a:bodyPr/>
+          <a:lstStyle/>
+          <a:p>
+            <a:r>
+              <a:rPr lang="en-US" dirty="0" smtClean="0"/>
+              <a:t>Status Update</a:t>
+            </a:r>
+            <a:endParaRPr lang="en-US" dirty="0"/>
+          </a:p>
+        </p:txBody>
+      </p:sp>
+      <p:sp>
+        <p:nvSpPr>
+          <p:cNvPr id="3" name="Content Placeholder 2"/>
+          <p:cNvSpPr>
+            <a:spLocks noGrp="1"/>
+          </p:cNvSpPr>
+          <p:nvPr>
+            <p:ph idx="1"/>
+          </p:nvPr>
+        </p:nvSpPr>
+        <p:spPr/>
+        <p:txBody>
+          <a:bodyPr/>
+          <a:lstStyle/>
+          <a:p>
+            <a:pPr>
+              <a:buFont typeface="Arial" panose="020B0604020202020204" pitchFamily="34" charset="0"/>
+              <a:buChar char="•"/>
+            </a:pPr>
+            <a:r>
+              <a:rPr lang="en-US" dirty="0" smtClean="0"/>
+              <a:t>To Do:</a:t>
+            </a:r>
+          </a:p>
+          <a:p>
+            <a:pPr lvl="1">
+              <a:buFont typeface="Arial" panose="020B0604020202020204" pitchFamily="34" charset="0"/>
+              <a:buChar char="•"/>
+            </a:pPr>
+            <a:r>
+              <a:rPr lang="en-US" dirty="0" smtClean="0"/>
+              <a:t>Modify Ubuntu Operating System to recognize ELFS files</a:t>
+            </a:r>
+          </a:p>
+          <a:p>
+            <a:pPr lvl="1">
+              <a:buFont typeface="Arial" panose="020B0604020202020204" pitchFamily="34" charset="0"/>
+              <a:buChar char="•"/>
+            </a:pPr>
+            <a:r>
+              <a:rPr lang="en-US" dirty="0" smtClean="0"/>
+              <a:t>Implement Safexec code on the Ubuntu OS</a:t>
+            </a:r>
+          </a:p>
+          <a:p>
+            <a:pPr lvl="1">
+              <a:buFont typeface="Arial" panose="020B0604020202020204" pitchFamily="34" charset="0"/>
+              <a:buChar char="•"/>
+            </a:pPr>
+            <a:r>
+              <a:rPr lang="en-US" dirty="0" smtClean="0"/>
+              <a:t>Create a “nice” user interface</a:t>
+            </a:r>
+          </a:p>
+          <a:p>
+            <a:pPr lvl="1">
+              <a:buFont typeface="Arial" panose="020B0604020202020204" pitchFamily="34" charset="0"/>
+              <a:buChar char="•"/>
+            </a:pPr>
+            <a:r>
+              <a:rPr lang="en-US" dirty="0" smtClean="0"/>
+              <a:t>Release project on GitHub</a:t>
+            </a:r>
+          </a:p>
+          <a:p>
+            <a:pPr lvl="1">
+              <a:buFont typeface="Arial" panose="020B0604020202020204" pitchFamily="34" charset="0"/>
+              <a:buChar char="•"/>
+            </a:pPr>
+            <a:r>
+              <a:rPr lang="en-US" dirty="0" smtClean="0"/>
+              <a:t>Relax!</a:t>
+            </a:r>
+            <a:endParaRPr lang="en-US" dirty="0"/>
+          </a:p>
+        </p:txBody>
+      </p:sp>
+      <p:pic>
+        <p:nvPicPr>
+          <p:cNvPr id="3074" name="Picture 2" descr="Related image"/>
+          <p:cNvPicPr>
+            <a:picLocks noChangeAspect="1" noChangeArrowheads="1"/>
+          </p:cNvPicPr>
+          <p:nvPr/>
+        </p:nvPicPr>
+        <p:blipFill>
+          <a:blip r:embed="rId2">
+            <a:extLst>
+              <a:ext uri="{28A0092B-C50C-407E-A947-70E740481C1C}">
+                <a14:useLocalDpi xmlns:a14="http://schemas.microsoft.com/office/drawing/2010/main" val="0"/>
+              </a:ext>
+            </a:extLst>
+          </a:blip>
+          <a:srcRect/>
+          <a:stretch>
+            <a:fillRect/>
+          </a:stretch>
+        </p:blipFill>
+        <p:spPr bwMode="auto">
+          <a:xfrm>
+            <a:off x="4345577" y="3166359"/>
+            <a:ext cx="2565172" cy="3042602"/>
+          </a:xfrm>
+          <a:prstGeom prst="rect">
+            <a:avLst/>
+          </a:prstGeom>
+          <a:noFill/>
+          <a:extLst>
+            <a:ext uri="{909E8E84-426E-40DD-AFC4-6F175D3DCCD1}">
+              <a14:hiddenFill xmlns:a14="http://schemas.microsoft.com/office/drawing/2010/main">
+                <a:solidFill>
+                  <a:srgbClr val="FFFFFF"/>
+                </a:solidFill>
+              </a14:hiddenFill>
+            </a:ext>
+          </a:extLst>
+        </p:spPr>
+      </p:pic>
+      <p:pic>
+        <p:nvPicPr>
+          <p:cNvPr id="3076" name="Picture 4" descr="Image result for xkcd new features"/>
+          <p:cNvPicPr>
+            <a:picLocks noChangeAspect="1" noChangeArrowheads="1"/>
+          </p:cNvPicPr>
+          <p:nvPr/>
+        </p:nvPicPr>
+        <p:blipFill>
+          <a:blip r:embed="rId3">
+            <a:extLst>
+              <a:ext uri="{28A0092B-C50C-407E-A947-70E740481C1C}">
+                <a14:useLocalDpi xmlns:a14="http://schemas.microsoft.com/office/drawing/2010/main" val="0"/>
+              </a:ext>
+            </a:extLst>
+          </a:blip>
+          <a:srcRect/>
+          <a:stretch>
+            <a:fillRect/>
+          </a:stretch>
+        </p:blipFill>
+        <p:spPr bwMode="auto">
+          <a:xfrm>
+            <a:off x="7741919" y="1945765"/>
+            <a:ext cx="3413761" cy="4263196"/>
+          </a:xfrm>
+          <a:prstGeom prst="rect">
+            <a:avLst/>
+          </a:prstGeom>
+          <a:noFill/>
+          <a:extLst>
+            <a:ext uri="{909E8E84-426E-40DD-AFC4-6F175D3DCCD1}">
+              <a14:hiddenFill xmlns:a14="http://schemas.microsoft.com/office/drawing/2010/main">
+                <a:solidFill>
+                  <a:srgbClr val="FFFFFF"/>
+                </a:solidFill>
+              </a14:hiddenFill>
+            </a:ext>
+          </a:extLst>
+        </p:spPr>
+      </p:pic>
+      <p:pic>
+        <p:nvPicPr>
+          <p:cNvPr id="3078" name="Picture 6" descr="Image result for xkcd"/>
+          <p:cNvPicPr>
+            <a:picLocks noChangeAspect="1" noChangeArrowheads="1"/>
+          </p:cNvPicPr>
+          <p:nvPr/>
+        </p:nvPicPr>
+        <p:blipFill>
+          <a:blip r:embed="rId4">
+            <a:extLst>
+              <a:ext uri="{28A0092B-C50C-407E-A947-70E740481C1C}">
+                <a14:useLocalDpi xmlns:a14="http://schemas.microsoft.com/office/drawing/2010/main" val="0"/>
+              </a:ext>
+            </a:extLst>
+          </a:blip>
+          <a:srcRect/>
+          <a:stretch>
+            <a:fillRect/>
+          </a:stretch>
+        </p:blipFill>
+        <p:spPr bwMode="auto">
+          <a:xfrm>
+            <a:off x="1193073" y="3828726"/>
+            <a:ext cx="2212975" cy="2380235"/>
+          </a:xfrm>
+          <a:prstGeom prst="rect">
+            <a:avLst/>
+          </a:prstGeom>
+          <a:noFill/>
+          <a:extLst>
+            <a:ext uri="{909E8E84-426E-40DD-AFC4-6F175D3DCCD1}">
+              <a14:hiddenFill xmlns:a14="http://schemas.microsoft.com/office/drawing/2010/main">
+                <a:solidFill>
+                  <a:srgbClr val="FFFFFF"/>
+                </a:solidFill>
+              </a14:hiddenFill>
+            </a:ext>
+          </a:extLst>
+        </p:spPr>
+      </p:pic>
+    </p:spTree>
+    <p:extLst>
+      <p:ext uri="{BB962C8B-B14F-4D97-AF65-F5344CB8AC3E}">
+        <p14:creationId xmlns:p14="http://schemas.microsoft.com/office/powerpoint/2010/main" val="2213242411"/>
+      </p:ext>
+    </p:extLst>
+  </p:cSld>
+  <p:clrMapOvr>
+    <a:masterClrMapping/>
+  </p:clrMapOvr>
+</p:sld>
+</file>
+
+<file path=ppt/slides/slide8.xml><?xml version="1.0" encoding="utf-8"?>
+<p:sld xmlns:a="http://schemas.openxmlformats.org/drawingml/2006/main" xmlns:r="http://schemas.openxmlformats.org/officeDocument/2006/relationships" xmlns:p="http://schemas.openxmlformats.org/presentationml/2006/main">
+  <p:cSld>
+    <p:spTree>
+      <p:nvGrpSpPr>
+        <p:cNvPr id="1" name=""/>
+        <p:cNvGrpSpPr/>
+        <p:nvPr/>
+      </p:nvGrpSpPr>
+      <p:grpSpPr>
+        <a:xfrm>
+          <a:off x="0" y="0"/>
+          <a:ext cx="0" cy="0"/>
+          <a:chOff x="0" y="0"/>
+          <a:chExt cx="0" cy="0"/>
+        </a:xfrm>
+      </p:grpSpPr>
+      <p:sp>
+        <p:nvSpPr>
+          <p:cNvPr id="2" name="Title 1"/>
+          <p:cNvSpPr>
+            <a:spLocks noGrp="1"/>
+          </p:cNvSpPr>
+          <p:nvPr>
             <p:ph type="ctrTitle"/>
           </p:nvPr>
         </p:nvSpPr>
@@ -4890,6 +5298,40 @@
               <a:t>Safexec</a:t>
             </a:r>
             <a:endParaRPr lang="en-US" dirty="0"/>
+          </a:p>
+        </p:txBody>
+      </p:sp>
+      <p:sp>
+        <p:nvSpPr>
+          <p:cNvPr id="4" name="TextBox 3"/>
+          <p:cNvSpPr txBox="1"/>
+          <p:nvPr/>
+        </p:nvSpPr>
+        <p:spPr>
+          <a:xfrm>
+            <a:off x="10825019" y="5598620"/>
+            <a:ext cx="1228436" cy="369332"/>
+          </a:xfrm>
+          <a:prstGeom prst="rect">
+            <a:avLst/>
+          </a:prstGeom>
+          <a:noFill/>
+        </p:spPr>
+        <p:txBody>
+          <a:bodyPr wrap="square" rtlCol="0">
+            <a:spAutoFit/>
+          </a:bodyPr>
+          <a:lstStyle/>
+          <a:p>
+            <a:r>
+              <a:rPr lang="en-US" dirty="0" smtClean="0"/>
+              <a:t>John </a:t>
+            </a:r>
+            <a:r>
+              <a:rPr lang="en-US" dirty="0" smtClean="0"/>
+              <a:t>Hardy</a:t>
+            </a:r>
+            <a:endParaRPr lang="en-US" dirty="0" smtClean="0"/>
           </a:p>
         </p:txBody>
       </p:sp>

</xml_diff>

<commit_message>
Finished Final Presentation slides
</commit_message>
<xml_diff>
--- a/Documents/Final Presentation.pptx
+++ b/Documents/Final Presentation.pptx
@@ -345,7 +345,7 @@
           <a:p>
             <a:fld id="{74AFDC4B-264C-476A-8687-5351AC00FB2C}" type="datetimeFigureOut">
               <a:rPr lang="en-US" smtClean="0"/>
-              <a:t>4/8/2019</a:t>
+              <a:t>4/9/2019</a:t>
             </a:fld>
             <a:endParaRPr lang="en-US"/>
           </a:p>
@@ -553,7 +553,7 @@
           <a:p>
             <a:fld id="{74AFDC4B-264C-476A-8687-5351AC00FB2C}" type="datetimeFigureOut">
               <a:rPr lang="en-US" smtClean="0"/>
-              <a:t>4/8/2019</a:t>
+              <a:t>4/9/2019</a:t>
             </a:fld>
             <a:endParaRPr lang="en-US"/>
           </a:p>
@@ -809,7 +809,7 @@
           <a:p>
             <a:fld id="{74AFDC4B-264C-476A-8687-5351AC00FB2C}" type="datetimeFigureOut">
               <a:rPr lang="en-US" smtClean="0"/>
-              <a:t>4/8/2019</a:t>
+              <a:t>4/9/2019</a:t>
             </a:fld>
             <a:endParaRPr lang="en-US"/>
           </a:p>
@@ -983,7 +983,7 @@
           <a:p>
             <a:fld id="{74AFDC4B-264C-476A-8687-5351AC00FB2C}" type="datetimeFigureOut">
               <a:rPr lang="en-US" smtClean="0"/>
-              <a:t>4/8/2019</a:t>
+              <a:t>4/9/2019</a:t>
             </a:fld>
             <a:endParaRPr lang="en-US"/>
           </a:p>
@@ -1326,7 +1326,7 @@
           <a:p>
             <a:fld id="{74AFDC4B-264C-476A-8687-5351AC00FB2C}" type="datetimeFigureOut">
               <a:rPr lang="en-US" smtClean="0"/>
-              <a:t>4/8/2019</a:t>
+              <a:t>4/9/2019</a:t>
             </a:fld>
             <a:endParaRPr lang="en-US"/>
           </a:p>
@@ -1601,7 +1601,7 @@
           <a:p>
             <a:fld id="{74AFDC4B-264C-476A-8687-5351AC00FB2C}" type="datetimeFigureOut">
               <a:rPr lang="en-US" smtClean="0"/>
-              <a:t>4/8/2019</a:t>
+              <a:t>4/9/2019</a:t>
             </a:fld>
             <a:endParaRPr lang="en-US"/>
           </a:p>
@@ -1980,7 +1980,7 @@
           <a:p>
             <a:fld id="{74AFDC4B-264C-476A-8687-5351AC00FB2C}" type="datetimeFigureOut">
               <a:rPr lang="en-US" smtClean="0"/>
-              <a:t>4/8/2019</a:t>
+              <a:t>4/9/2019</a:t>
             </a:fld>
             <a:endParaRPr lang="en-US"/>
           </a:p>
@@ -2098,7 +2098,7 @@
           <a:p>
             <a:fld id="{74AFDC4B-264C-476A-8687-5351AC00FB2C}" type="datetimeFigureOut">
               <a:rPr lang="en-US" smtClean="0"/>
-              <a:t>4/8/2019</a:t>
+              <a:t>4/9/2019</a:t>
             </a:fld>
             <a:endParaRPr lang="en-US"/>
           </a:p>
@@ -2269,7 +2269,7 @@
           <a:p>
             <a:fld id="{74AFDC4B-264C-476A-8687-5351AC00FB2C}" type="datetimeFigureOut">
               <a:rPr lang="en-US" smtClean="0"/>
-              <a:t>4/8/2019</a:t>
+              <a:t>4/9/2019</a:t>
             </a:fld>
             <a:endParaRPr lang="en-US"/>
           </a:p>
@@ -2623,7 +2623,7 @@
           <a:p>
             <a:fld id="{74AFDC4B-264C-476A-8687-5351AC00FB2C}" type="datetimeFigureOut">
               <a:rPr lang="en-US" smtClean="0"/>
-              <a:t>4/8/2019</a:t>
+              <a:t>4/9/2019</a:t>
             </a:fld>
             <a:endParaRPr lang="en-US"/>
           </a:p>
@@ -3005,7 +3005,7 @@
           <a:p>
             <a:fld id="{74AFDC4B-264C-476A-8687-5351AC00FB2C}" type="datetimeFigureOut">
               <a:rPr lang="en-US" smtClean="0"/>
-              <a:t>4/8/2019</a:t>
+              <a:t>4/9/2019</a:t>
             </a:fld>
             <a:endParaRPr lang="en-US"/>
           </a:p>
@@ -3292,7 +3292,7 @@
           <a:p>
             <a:fld id="{74AFDC4B-264C-476A-8687-5351AC00FB2C}" type="datetimeFigureOut">
               <a:rPr lang="en-US" smtClean="0"/>
-              <a:t>4/8/2019</a:t>
+              <a:t>4/9/2019</a:t>
             </a:fld>
             <a:endParaRPr lang="en-US"/>
           </a:p>
@@ -3996,13 +3996,8 @@
             </a:pPr>
             <a:r>
               <a:rPr lang="en-US" dirty="0" smtClean="0"/>
-              <a:t>Result is a new safe-to-execute file format called “ELFS” (Executable and Linkable Format Secure</a:t>
-            </a:r>
-            <a:r>
-              <a:rPr lang="en-US" dirty="0" smtClean="0"/>
-              <a:t>) which is sent to the end user.</a:t>
-            </a:r>
-            <a:endParaRPr lang="en-US" dirty="0" smtClean="0"/>
+              <a:t>Result is a new safe-to-execute file format called “ELFS” (Executable and Linkable Format Secure) which is sent to the end user.</a:t>
+            </a:r>
           </a:p>
           <a:p>
             <a:pPr marL="544068" lvl="1" indent="-342900">
@@ -4435,11 +4430,7 @@
             </a:pPr>
             <a:r>
               <a:rPr lang="en-US" dirty="0" smtClean="0"/>
-              <a:t>Cryptography </a:t>
-            </a:r>
-            <a:r>
-              <a:rPr lang="en-US" dirty="0" smtClean="0"/>
-              <a:t>is fun!</a:t>
+              <a:t>Cryptography is fun!</a:t>
             </a:r>
           </a:p>
           <a:p>
@@ -4459,11 +4450,7 @@
             </a:pPr>
             <a:r>
               <a:rPr lang="en-US" dirty="0" smtClean="0"/>
-              <a:t>I want to make my own application from </a:t>
-            </a:r>
-            <a:r>
-              <a:rPr lang="en-US" dirty="0" smtClean="0"/>
-              <a:t>scratch</a:t>
+              <a:t>I want to make my own application from scratch</a:t>
             </a:r>
           </a:p>
           <a:p>
@@ -4642,114 +4629,153 @@
             </a:pPr>
             <a:r>
               <a:rPr lang="en-US" dirty="0" smtClean="0"/>
-              <a:t>Point of view for code developer:</a:t>
-            </a:r>
-          </a:p>
-          <a:p>
-            <a:pPr lvl="1">
-              <a:buFont typeface="Arial" panose="020B0604020202020204" pitchFamily="34" charset="0"/>
-              <a:buChar char="•"/>
-            </a:pPr>
+              <a:t>At this point, the application is not very user-friendly </a:t>
+            </a:r>
+            <a:r>
+              <a:rPr lang="en-US" dirty="0"/>
+              <a:t>😬</a:t>
+            </a:r>
             <a:r>
               <a:rPr lang="en-US" dirty="0" smtClean="0"/>
-              <a:t>Build or Compile your code as normal</a:t>
-            </a:r>
-          </a:p>
-          <a:p>
-            <a:pPr lvl="1">
-              <a:buFont typeface="Arial" panose="020B0604020202020204" pitchFamily="34" charset="0"/>
-              <a:buChar char="•"/>
-            </a:pPr>
+              <a:t>, </a:t>
+            </a:r>
+            <a:r>
+              <a:rPr lang="en-US" i="1" dirty="0" smtClean="0"/>
+              <a:t>but it works</a:t>
+            </a:r>
             <a:r>
               <a:rPr lang="en-US" dirty="0" smtClean="0"/>
-              <a:t>Run the Safexec application</a:t>
-            </a:r>
-          </a:p>
-          <a:p>
-            <a:pPr lvl="1">
-              <a:buFont typeface="Arial" panose="020B0604020202020204" pitchFamily="34" charset="0"/>
-              <a:buChar char="•"/>
-            </a:pPr>
+              <a:t>.</a:t>
+            </a:r>
+            <a:endParaRPr lang="en-US" dirty="0"/>
+          </a:p>
+        </p:txBody>
+      </p:sp>
+      <p:pic>
+        <p:nvPicPr>
+          <p:cNvPr id="4" name="Picture 3"/>
+          <p:cNvPicPr>
+            <a:picLocks noChangeAspect="1"/>
+          </p:cNvPicPr>
+          <p:nvPr/>
+        </p:nvPicPr>
+        <p:blipFill>
+          <a:blip r:embed="rId2">
+            <a:extLst>
+              <a:ext uri="{28A0092B-C50C-407E-A947-70E740481C1C}">
+                <a14:useLocalDpi xmlns:a14="http://schemas.microsoft.com/office/drawing/2010/main" val="0"/>
+              </a:ext>
+            </a:extLst>
+          </a:blip>
+          <a:stretch>
+            <a:fillRect/>
+          </a:stretch>
+        </p:blipFill>
+        <p:spPr>
+          <a:xfrm>
+            <a:off x="5442350" y="2574629"/>
+            <a:ext cx="6095658" cy="2798833"/>
+          </a:xfrm>
+          <a:prstGeom prst="rect">
+            <a:avLst/>
+          </a:prstGeom>
+        </p:spPr>
+      </p:pic>
+      <p:pic>
+        <p:nvPicPr>
+          <p:cNvPr id="5" name="Picture 4"/>
+          <p:cNvPicPr>
+            <a:picLocks noChangeAspect="1"/>
+          </p:cNvPicPr>
+          <p:nvPr/>
+        </p:nvPicPr>
+        <p:blipFill>
+          <a:blip r:embed="rId3">
+            <a:extLst>
+              <a:ext uri="{28A0092B-C50C-407E-A947-70E740481C1C}">
+                <a14:useLocalDpi xmlns:a14="http://schemas.microsoft.com/office/drawing/2010/main" val="0"/>
+              </a:ext>
+            </a:extLst>
+          </a:blip>
+          <a:stretch>
+            <a:fillRect/>
+          </a:stretch>
+        </p:blipFill>
+        <p:spPr>
+          <a:xfrm>
+            <a:off x="714952" y="2330516"/>
+            <a:ext cx="4345070" cy="3287061"/>
+          </a:xfrm>
+          <a:prstGeom prst="rect">
+            <a:avLst/>
+          </a:prstGeom>
+        </p:spPr>
+      </p:pic>
+      <p:sp>
+        <p:nvSpPr>
+          <p:cNvPr id="6" name="TextBox 5"/>
+          <p:cNvSpPr txBox="1"/>
+          <p:nvPr/>
+        </p:nvSpPr>
+        <p:spPr>
+          <a:xfrm>
+            <a:off x="1015144" y="5733027"/>
+            <a:ext cx="3744686" cy="369332"/>
+          </a:xfrm>
+          <a:prstGeom prst="rect">
+            <a:avLst/>
+          </a:prstGeom>
+          <a:noFill/>
+        </p:spPr>
+        <p:txBody>
+          <a:bodyPr wrap="square" rtlCol="0">
+            <a:spAutoFit/>
+          </a:bodyPr>
+          <a:lstStyle/>
+          <a:p>
+            <a:pPr algn="ctr"/>
             <a:r>
               <a:rPr lang="en-US" dirty="0" smtClean="0"/>
-              <a:t>Provide </a:t>
-            </a:r>
+              <a:t>Signing an ELF File</a:t>
+            </a:r>
+            <a:endParaRPr lang="en-US" dirty="0"/>
+          </a:p>
+        </p:txBody>
+      </p:sp>
+      <p:sp>
+        <p:nvSpPr>
+          <p:cNvPr id="7" name="TextBox 6"/>
+          <p:cNvSpPr txBox="1"/>
+          <p:nvPr/>
+        </p:nvSpPr>
+        <p:spPr>
+          <a:xfrm>
+            <a:off x="6617836" y="5733027"/>
+            <a:ext cx="3744686" cy="369332"/>
+          </a:xfrm>
+          <a:prstGeom prst="rect">
+            <a:avLst/>
+          </a:prstGeom>
+          <a:noFill/>
+        </p:spPr>
+        <p:txBody>
+          <a:bodyPr wrap="square" rtlCol="0">
+            <a:spAutoFit/>
+          </a:bodyPr>
+          <a:lstStyle/>
+          <a:p>
+            <a:pPr algn="ctr"/>
             <a:r>
               <a:rPr lang="en-US" dirty="0" smtClean="0"/>
-              <a:t>the file location of the binary executable file</a:t>
-            </a:r>
-          </a:p>
-          <a:p>
-            <a:pPr lvl="1">
-              <a:buFont typeface="Arial" panose="020B0604020202020204" pitchFamily="34" charset="0"/>
-              <a:buChar char="•"/>
-            </a:pPr>
+              <a:t>Checking </a:t>
+            </a:r>
+            <a:r>
+              <a:rPr lang="en-US" smtClean="0"/>
+              <a:t>a Signed </a:t>
+            </a:r>
             <a:r>
               <a:rPr lang="en-US" dirty="0" smtClean="0"/>
-              <a:t>Wait for </a:t>
-            </a:r>
-            <a:r>
-              <a:rPr lang="en-US" dirty="0" err="1" smtClean="0"/>
-              <a:t>Safexec</a:t>
-            </a:r>
-            <a:r>
-              <a:rPr lang="en-US" dirty="0" smtClean="0"/>
-              <a:t> to finish hashing the file and modifying the executable</a:t>
-            </a:r>
-          </a:p>
-          <a:p>
-            <a:pPr lvl="1">
-              <a:buFont typeface="Arial" panose="020B0604020202020204" pitchFamily="34" charset="0"/>
-              <a:buChar char="•"/>
-            </a:pPr>
-            <a:r>
-              <a:rPr lang="en-US" dirty="0" smtClean="0"/>
-              <a:t>Submit the application to the users</a:t>
-            </a:r>
-          </a:p>
-          <a:p>
-            <a:pPr lvl="1">
-              <a:buFont typeface="Arial" panose="020B0604020202020204" pitchFamily="34" charset="0"/>
-              <a:buChar char="•"/>
-            </a:pPr>
-            <a:endParaRPr lang="en-US" dirty="0"/>
-          </a:p>
-          <a:p>
-            <a:pPr>
-              <a:buFont typeface="Arial" panose="020B0604020202020204" pitchFamily="34" charset="0"/>
-              <a:buChar char="•"/>
-            </a:pPr>
-            <a:r>
-              <a:rPr lang="en-US" dirty="0" smtClean="0"/>
-              <a:t>Point of view for user:</a:t>
-            </a:r>
-          </a:p>
-          <a:p>
-            <a:pPr lvl="1">
-              <a:buFont typeface="Arial" panose="020B0604020202020204" pitchFamily="34" charset="0"/>
-              <a:buChar char="•"/>
-            </a:pPr>
-            <a:r>
-              <a:rPr lang="en-US" dirty="0" smtClean="0"/>
-              <a:t>Run the modified </a:t>
-            </a:r>
-            <a:r>
-              <a:rPr lang="en-US" dirty="0" err="1" smtClean="0"/>
-              <a:t>Safexec</a:t>
-            </a:r>
-            <a:r>
-              <a:rPr lang="en-US" dirty="0" smtClean="0"/>
-              <a:t> Ubuntu operating system</a:t>
-            </a:r>
-          </a:p>
-          <a:p>
-            <a:pPr lvl="1">
-              <a:buFont typeface="Arial" panose="020B0604020202020204" pitchFamily="34" charset="0"/>
-              <a:buChar char="•"/>
-            </a:pPr>
-            <a:r>
-              <a:rPr lang="en-US" dirty="0" smtClean="0"/>
-              <a:t>Run the code as normal! If anything goes wrong Linux will tell you.</a:t>
+              <a:t>ELFS File</a:t>
             </a:r>
             <a:endParaRPr lang="en-US" dirty="0"/>
           </a:p>
@@ -5325,13 +5351,8 @@
           <a:p>
             <a:r>
               <a:rPr lang="en-US" dirty="0" smtClean="0"/>
-              <a:t>John </a:t>
-            </a:r>
-            <a:r>
-              <a:rPr lang="en-US" dirty="0" smtClean="0"/>
-              <a:t>Hardy</a:t>
-            </a:r>
-            <a:endParaRPr lang="en-US" dirty="0" smtClean="0"/>
+              <a:t>John Hardy</a:t>
+            </a:r>
           </a:p>
         </p:txBody>
       </p:sp>

</xml_diff>